<commit_message>
Insert Link on PPT
</commit_message>
<xml_diff>
--- a/AICTE PPT Template.pptx
+++ b/AICTE PPT Template.pptx
@@ -4786,9 +4786,12 @@
           <a:lstStyle/>
           <a:p>
             <a:r>
-              <a:rPr lang="en-IN" sz="2000" dirty="0"/>
+              <a:rPr lang="en-IN" sz="2000" dirty="0">
+                <a:hlinkClick r:id="rId2"/>
+              </a:rPr>
               <a:t>https://github.com/AniketDohale/Steganography.git</a:t>
             </a:r>
+            <a:endParaRPr lang="en-IN" sz="2000" dirty="0"/>
           </a:p>
         </p:txBody>
       </p:sp>
@@ -7458,12 +7461,11 @@
 </file>
 
 <file path=customXml/item1.xml><?xml version="1.0" encoding="utf-8"?>
-<?mso-contentType ?>
-<FormTemplates xmlns="http://schemas.microsoft.com/sharepoint/v3/contenttype/forms">
-  <Display>DocumentLibraryForm</Display>
-  <Edit>DocumentLibraryForm</Edit>
-  <New>DocumentLibraryForm</New>
-</FormTemplates>
+<p:properties xmlns:p="http://schemas.microsoft.com/office/2006/metadata/properties" xmlns:xsi="http://www.w3.org/2001/XMLSchema-instance" xmlns:pc="http://schemas.microsoft.com/office/infopath/2007/PartnerControls">
+  <documentManagement>
+    <_activity xmlns="b30265f8-c5e2-4918-b4a1-b977299ca3e2" xsi:nil="true"/>
+  </documentManagement>
+</p:properties>
 </file>
 
 <file path=customXml/item2.xml><?xml version="1.0" encoding="utf-8"?>
@@ -7700,17 +7702,27 @@
 </file>
 
 <file path=customXml/item3.xml><?xml version="1.0" encoding="utf-8"?>
-<p:properties xmlns:p="http://schemas.microsoft.com/office/2006/metadata/properties" xmlns:xsi="http://www.w3.org/2001/XMLSchema-instance" xmlns:pc="http://schemas.microsoft.com/office/infopath/2007/PartnerControls">
-  <documentManagement>
-    <_activity xmlns="b30265f8-c5e2-4918-b4a1-b977299ca3e2" xsi:nil="true"/>
-  </documentManagement>
-</p:properties>
+<?mso-contentType ?>
+<FormTemplates xmlns="http://schemas.microsoft.com/sharepoint/v3/contenttype/forms">
+  <Display>DocumentLibraryForm</Display>
+  <Edit>DocumentLibraryForm</Edit>
+  <New>DocumentLibraryForm</New>
+</FormTemplates>
 </file>
 
 <file path=customXml/itemProps1.xml><?xml version="1.0" encoding="utf-8"?>
-<ds:datastoreItem xmlns:ds="http://schemas.openxmlformats.org/officeDocument/2006/customXml" ds:itemID="{927BD4C1-B6B1-4715-ABF9-E660A51A4EA0}">
+<ds:datastoreItem xmlns:ds="http://schemas.openxmlformats.org/officeDocument/2006/customXml" ds:itemID="{8D289AE2-D2AE-49D1-AFAC-3A79F6794255}">
   <ds:schemaRefs>
-    <ds:schemaRef ds:uri="http://schemas.microsoft.com/sharepoint/v3/contenttype/forms"/>
+    <ds:schemaRef ds:uri="http://schemas.openxmlformats.org/package/2006/metadata/core-properties"/>
+    <ds:schemaRef ds:uri="http://schemas.microsoft.com/office/2006/documentManagement/types"/>
+    <ds:schemaRef ds:uri="http://purl.org/dc/dcmitype/"/>
+    <ds:schemaRef ds:uri="http://schemas.microsoft.com/office/infopath/2007/PartnerControls"/>
+    <ds:schemaRef ds:uri="http://purl.org/dc/elements/1.1/"/>
+    <ds:schemaRef ds:uri="http://schemas.microsoft.com/office/2006/metadata/properties"/>
+    <ds:schemaRef ds:uri="fadb41d3-f9cb-40fb-903c-8cacaba95bb5"/>
+    <ds:schemaRef ds:uri="http://purl.org/dc/terms/"/>
+    <ds:schemaRef ds:uri="b30265f8-c5e2-4918-b4a1-b977299ca3e2"/>
+    <ds:schemaRef ds:uri="http://www.w3.org/XML/1998/namespace"/>
   </ds:schemaRefs>
 </ds:datastoreItem>
 </file>
@@ -7735,18 +7747,9 @@
 </file>
 
 <file path=customXml/itemProps3.xml><?xml version="1.0" encoding="utf-8"?>
-<ds:datastoreItem xmlns:ds="http://schemas.openxmlformats.org/officeDocument/2006/customXml" ds:itemID="{8D289AE2-D2AE-49D1-AFAC-3A79F6794255}">
+<ds:datastoreItem xmlns:ds="http://schemas.openxmlformats.org/officeDocument/2006/customXml" ds:itemID="{927BD4C1-B6B1-4715-ABF9-E660A51A4EA0}">
   <ds:schemaRefs>
-    <ds:schemaRef ds:uri="http://schemas.openxmlformats.org/package/2006/metadata/core-properties"/>
-    <ds:schemaRef ds:uri="http://schemas.microsoft.com/office/2006/documentManagement/types"/>
-    <ds:schemaRef ds:uri="http://purl.org/dc/dcmitype/"/>
-    <ds:schemaRef ds:uri="http://schemas.microsoft.com/office/infopath/2007/PartnerControls"/>
-    <ds:schemaRef ds:uri="http://purl.org/dc/elements/1.1/"/>
-    <ds:schemaRef ds:uri="http://schemas.microsoft.com/office/2006/metadata/properties"/>
-    <ds:schemaRef ds:uri="fadb41d3-f9cb-40fb-903c-8cacaba95bb5"/>
-    <ds:schemaRef ds:uri="http://purl.org/dc/terms/"/>
-    <ds:schemaRef ds:uri="b30265f8-c5e2-4918-b4a1-b977299ca3e2"/>
-    <ds:schemaRef ds:uri="http://www.w3.org/XML/1998/namespace"/>
+    <ds:schemaRef ds:uri="http://schemas.microsoft.com/sharepoint/v3/contenttype/forms"/>
   </ds:schemaRefs>
 </ds:datastoreItem>
 </file>
</xml_diff>